<commit_message>
Adding instructions on opening perspective
</commit_message>
<xml_diff>
--- a/presentations/2 CS-Studio - DataBrowser.pptx
+++ b/presentations/2 CS-Studio - DataBrowser.pptx
@@ -11,8 +11,8 @@
     <p:sldId id="256" r:id="rId2"/>
     <p:sldId id="263" r:id="rId3"/>
     <p:sldId id="259" r:id="rId4"/>
-    <p:sldId id="266" r:id="rId5"/>
-    <p:sldId id="267" r:id="rId6"/>
+    <p:sldId id="267" r:id="rId5"/>
+    <p:sldId id="266" r:id="rId6"/>
     <p:sldId id="261" r:id="rId7"/>
     <p:sldId id="268" r:id="rId8"/>
     <p:sldId id="265" r:id="rId9"/>
@@ -207,7 +207,7 @@
           <a:p>
             <a:fld id="{EF57AB2E-1891-4DAF-8A65-4E2810D33976}" type="datetimeFigureOut">
               <a:rPr lang="en-US" smtClean="0"/>
-              <a:t>3/21/2016</a:t>
+              <a:t>5/16/2016</a:t>
             </a:fld>
             <a:endParaRPr lang="en-US"/>
           </a:p>
@@ -813,7 +813,7 @@
           <a:p>
             <a:fld id="{EC8C94C6-5DF2-417C-89DE-672CE0849ED7}" type="slidenum">
               <a:rPr lang="en-US" smtClean="0"/>
-              <a:t>4</a:t>
+              <a:t>5</a:t>
             </a:fld>
             <a:endParaRPr lang="en-US"/>
           </a:p>
@@ -1499,7 +1499,7 @@
           <a:p>
             <a:fld id="{9337FA49-6A0D-48CD-9C1B-978CD540451A}" type="datetimeFigureOut">
               <a:rPr lang="en-US" smtClean="0"/>
-              <a:t>3/21/2016</a:t>
+              <a:t>5/16/2016</a:t>
             </a:fld>
             <a:endParaRPr lang="en-US"/>
           </a:p>
@@ -1669,7 +1669,7 @@
           <a:p>
             <a:fld id="{9337FA49-6A0D-48CD-9C1B-978CD540451A}" type="datetimeFigureOut">
               <a:rPr lang="en-US" smtClean="0"/>
-              <a:t>3/21/2016</a:t>
+              <a:t>5/16/2016</a:t>
             </a:fld>
             <a:endParaRPr lang="en-US"/>
           </a:p>
@@ -1849,7 +1849,7 @@
           <a:p>
             <a:fld id="{9337FA49-6A0D-48CD-9C1B-978CD540451A}" type="datetimeFigureOut">
               <a:rPr lang="en-US" smtClean="0"/>
-              <a:t>3/21/2016</a:t>
+              <a:t>5/16/2016</a:t>
             </a:fld>
             <a:endParaRPr lang="en-US"/>
           </a:p>
@@ -2019,7 +2019,7 @@
           <a:p>
             <a:fld id="{9337FA49-6A0D-48CD-9C1B-978CD540451A}" type="datetimeFigureOut">
               <a:rPr lang="en-US" smtClean="0"/>
-              <a:t>3/21/2016</a:t>
+              <a:t>5/16/2016</a:t>
             </a:fld>
             <a:endParaRPr lang="en-US"/>
           </a:p>
@@ -2265,7 +2265,7 @@
           <a:p>
             <a:fld id="{9337FA49-6A0D-48CD-9C1B-978CD540451A}" type="datetimeFigureOut">
               <a:rPr lang="en-US" smtClean="0"/>
-              <a:t>3/21/2016</a:t>
+              <a:t>5/16/2016</a:t>
             </a:fld>
             <a:endParaRPr lang="en-US"/>
           </a:p>
@@ -2497,7 +2497,7 @@
           <a:p>
             <a:fld id="{9337FA49-6A0D-48CD-9C1B-978CD540451A}" type="datetimeFigureOut">
               <a:rPr lang="en-US" smtClean="0"/>
-              <a:t>3/21/2016</a:t>
+              <a:t>5/16/2016</a:t>
             </a:fld>
             <a:endParaRPr lang="en-US"/>
           </a:p>
@@ -2864,7 +2864,7 @@
           <a:p>
             <a:fld id="{9337FA49-6A0D-48CD-9C1B-978CD540451A}" type="datetimeFigureOut">
               <a:rPr lang="en-US" smtClean="0"/>
-              <a:t>3/21/2016</a:t>
+              <a:t>5/16/2016</a:t>
             </a:fld>
             <a:endParaRPr lang="en-US"/>
           </a:p>
@@ -2982,7 +2982,7 @@
           <a:p>
             <a:fld id="{9337FA49-6A0D-48CD-9C1B-978CD540451A}" type="datetimeFigureOut">
               <a:rPr lang="en-US" smtClean="0"/>
-              <a:t>3/21/2016</a:t>
+              <a:t>5/16/2016</a:t>
             </a:fld>
             <a:endParaRPr lang="en-US"/>
           </a:p>
@@ -3077,7 +3077,7 @@
           <a:p>
             <a:fld id="{9337FA49-6A0D-48CD-9C1B-978CD540451A}" type="datetimeFigureOut">
               <a:rPr lang="en-US" smtClean="0"/>
-              <a:t>3/21/2016</a:t>
+              <a:t>5/16/2016</a:t>
             </a:fld>
             <a:endParaRPr lang="en-US"/>
           </a:p>
@@ -3354,7 +3354,7 @@
           <a:p>
             <a:fld id="{9337FA49-6A0D-48CD-9C1B-978CD540451A}" type="datetimeFigureOut">
               <a:rPr lang="en-US" smtClean="0"/>
-              <a:t>3/21/2016</a:t>
+              <a:t>5/16/2016</a:t>
             </a:fld>
             <a:endParaRPr lang="en-US"/>
           </a:p>
@@ -3607,7 +3607,7 @@
           <a:p>
             <a:fld id="{9337FA49-6A0D-48CD-9C1B-978CD540451A}" type="datetimeFigureOut">
               <a:rPr lang="en-US" smtClean="0"/>
-              <a:t>3/21/2016</a:t>
+              <a:t>5/16/2016</a:t>
             </a:fld>
             <a:endParaRPr lang="en-US"/>
           </a:p>
@@ -3820,7 +3820,7 @@
           <a:p>
             <a:fld id="{9337FA49-6A0D-48CD-9C1B-978CD540451A}" type="datetimeFigureOut">
               <a:rPr lang="en-US" smtClean="0"/>
-              <a:t>3/21/2016</a:t>
+              <a:t>5/16/2016</a:t>
             </a:fld>
             <a:endParaRPr lang="en-US"/>
           </a:p>
@@ -4780,7 +4780,13 @@
               <a:rPr lang="en-US" dirty="0" smtClean="0">
                 <a:sym typeface="Wingdings" panose="05000000000000000000" pitchFamily="2" charset="2"/>
               </a:rPr>
-              <a:t> Trends</a:t>
+              <a:t> </a:t>
+            </a:r>
+            <a:r>
+              <a:rPr lang="en-US" dirty="0" smtClean="0">
+                <a:sym typeface="Wingdings" panose="05000000000000000000" pitchFamily="2" charset="2"/>
+              </a:rPr>
+              <a:t>Trends</a:t>
             </a:r>
             <a:r>
               <a:rPr lang="en-US" dirty="0" smtClean="0"/>
@@ -4877,7 +4883,7 @@
         </p:nvSpPr>
         <p:spPr>
           <a:xfrm>
-            <a:off x="3019309" y="3556538"/>
+            <a:off x="3356763" y="3556538"/>
             <a:ext cx="457200" cy="457200"/>
           </a:xfrm>
           <a:prstGeom prst="ellipse">
@@ -4917,7 +4923,7 @@
         </p:nvSpPr>
         <p:spPr>
           <a:xfrm>
-            <a:off x="2836429" y="3373658"/>
+            <a:off x="3173883" y="3373658"/>
             <a:ext cx="822960" cy="822960"/>
           </a:xfrm>
           <a:prstGeom prst="ellipse">
@@ -4957,7 +4963,7 @@
         </p:nvSpPr>
         <p:spPr>
           <a:xfrm>
-            <a:off x="2927869" y="3465098"/>
+            <a:off x="3265323" y="3465098"/>
             <a:ext cx="640080" cy="640080"/>
           </a:xfrm>
           <a:prstGeom prst="ellipse">
@@ -5051,7 +5057,7 @@
       </p:grpSpPr>
       <p:sp>
         <p:nvSpPr>
-          <p:cNvPr id="7" name="Title 6"/>
+          <p:cNvPr id="2" name="Title 1"/>
           <p:cNvSpPr>
             <a:spLocks noGrp="1"/>
           </p:cNvSpPr>
@@ -5066,7 +5072,7 @@
           <a:p>
             <a:r>
               <a:rPr lang="en-US" dirty="0" smtClean="0"/>
-              <a:t>Adding PV’s</a:t>
+              <a:t>Data Browser Perspective</a:t>
             </a:r>
             <a:endParaRPr lang="en-US" dirty="0"/>
           </a:p>
@@ -5074,7 +5080,7 @@
       </p:sp>
       <p:sp>
         <p:nvSpPr>
-          <p:cNvPr id="8" name="Text Placeholder 7"/>
+          <p:cNvPr id="4" name="Text Placeholder 3"/>
           <p:cNvSpPr>
             <a:spLocks noGrp="1"/>
           </p:cNvSpPr>
@@ -5082,7 +5088,12 @@
             <p:ph type="body" sz="half" idx="2"/>
           </p:nvPr>
         </p:nvSpPr>
-        <p:spPr/>
+        <p:spPr>
+          <a:xfrm>
+            <a:off x="839789" y="2057400"/>
+            <a:ext cx="3623354" cy="3811588"/>
+          </a:xfrm>
+        </p:spPr>
         <p:txBody>
           <a:bodyPr/>
           <a:lstStyle/>
@@ -5093,30 +5104,41 @@
             </a:pPr>
             <a:r>
               <a:rPr lang="en-US" dirty="0" smtClean="0"/>
-              <a:t>Right click </a:t>
+              <a:t>Open from context menu</a:t>
+            </a:r>
+          </a:p>
+          <a:p>
+            <a:pPr marL="285750" indent="-285750">
+              <a:buFont typeface="Arial" panose="020B0604020202020204" pitchFamily="34" charset="0"/>
+              <a:buChar char="•"/>
+            </a:pPr>
+            <a:r>
+              <a:rPr lang="en-US" dirty="0" err="1" smtClean="0"/>
+              <a:t>Window</a:t>
+            </a:r>
+            <a:r>
+              <a:rPr lang="en-US" dirty="0" err="1" smtClean="0">
+                <a:sym typeface="Wingdings" panose="05000000000000000000" pitchFamily="2" charset="2"/>
+              </a:rPr>
+              <a:t>Open</a:t>
             </a:r>
             <a:r>
               <a:rPr lang="en-US" dirty="0" smtClean="0">
                 <a:sym typeface="Wingdings" panose="05000000000000000000" pitchFamily="2" charset="2"/>
               </a:rPr>
-              <a:t> Add PV</a:t>
-            </a:r>
-            <a:br>
-              <a:rPr lang="en-US" dirty="0" smtClean="0">
+              <a:t> </a:t>
+            </a:r>
+            <a:r>
+              <a:rPr lang="en-US" dirty="0" err="1" smtClean="0">
                 <a:sym typeface="Wingdings" panose="05000000000000000000" pitchFamily="2" charset="2"/>
               </a:rPr>
-            </a:br>
-            <a:r>
-              <a:rPr lang="en-US" dirty="0" smtClean="0">
-                <a:sym typeface="Wingdings" panose="05000000000000000000" pitchFamily="2" charset="2"/>
-              </a:rPr>
-              <a:t>Name</a:t>
+              <a:t>PerspectiveOther</a:t>
             </a:r>
             <a:r>
               <a:rPr lang="en-US" dirty="0">
                 <a:sym typeface="Wingdings" panose="05000000000000000000" pitchFamily="2" charset="2"/>
               </a:rPr>
-              <a:t>:</a:t>
+              <a:t/>
             </a:r>
             <a:br>
               <a:rPr lang="en-US" dirty="0">
@@ -5124,49 +5146,120 @@
               </a:rPr>
             </a:br>
             <a:r>
-              <a:rPr lang="en-US" i="1" dirty="0" smtClean="0">
+              <a:rPr lang="en-US" dirty="0" smtClean="0">
                 <a:sym typeface="Wingdings" panose="05000000000000000000" pitchFamily="2" charset="2"/>
               </a:rPr>
-              <a:t>XF:31IDA-OP{Tbl-Ax:X2}</a:t>
-            </a:r>
-            <a:r>
-              <a:rPr lang="en-US" i="1" dirty="0" err="1" smtClean="0">
+              <a:t>	</a:t>
+            </a:r>
+            <a:r>
+              <a:rPr lang="en-US" dirty="0" err="1" smtClean="0">
                 <a:sym typeface="Wingdings" panose="05000000000000000000" pitchFamily="2" charset="2"/>
               </a:rPr>
-              <a:t>Mtr</a:t>
-            </a:r>
-            <a:endParaRPr lang="en-US" i="1" dirty="0" smtClean="0">
-              <a:sym typeface="Wingdings" panose="05000000000000000000" pitchFamily="2" charset="2"/>
-            </a:endParaRPr>
-          </a:p>
-          <a:p>
-            <a:r>
-              <a:rPr lang="en-US" i="1" dirty="0">
+              <a:t>Databrowser</a:t>
+            </a:r>
+            <a:r>
+              <a:rPr lang="en-US" dirty="0" smtClean="0">
                 <a:sym typeface="Wingdings" panose="05000000000000000000" pitchFamily="2" charset="2"/>
               </a:rPr>
-              <a:t/>
-            </a:r>
-            <a:br>
-              <a:rPr lang="en-US" i="1" dirty="0">
-                <a:sym typeface="Wingdings" panose="05000000000000000000" pitchFamily="2" charset="2"/>
-              </a:rPr>
-            </a:br>
-            <a:endParaRPr lang="en-US" i="1" dirty="0" smtClean="0">
-              <a:sym typeface="Wingdings" panose="05000000000000000000" pitchFamily="2" charset="2"/>
-            </a:endParaRPr>
+              <a:t> Perspective</a:t>
+            </a:r>
+            <a:endParaRPr lang="en-US" dirty="0" smtClean="0"/>
           </a:p>
           <a:p>
             <a:pPr marL="285750" indent="-285750">
               <a:buFont typeface="Arial" panose="020B0604020202020204" pitchFamily="34" charset="0"/>
               <a:buChar char="•"/>
             </a:pPr>
-            <a:endParaRPr lang="en-US" i="1" dirty="0"/>
+            <a:endParaRPr lang="en-US" dirty="0"/>
+          </a:p>
+          <a:p>
+            <a:pPr marL="285750" indent="-285750">
+              <a:buFont typeface="Arial" panose="020B0604020202020204" pitchFamily="34" charset="0"/>
+              <a:buChar char="•"/>
+            </a:pPr>
+            <a:r>
+              <a:rPr lang="en-US" dirty="0" smtClean="0"/>
+              <a:t>Plot</a:t>
+            </a:r>
+            <a:endParaRPr lang="en-US" dirty="0" smtClean="0"/>
+          </a:p>
+          <a:p>
+            <a:pPr marL="285750" indent="-285750">
+              <a:buFont typeface="Arial" panose="020B0604020202020204" pitchFamily="34" charset="0"/>
+              <a:buChar char="•"/>
+            </a:pPr>
+            <a:r>
+              <a:rPr lang="en-US" dirty="0" smtClean="0"/>
+              <a:t>Archive Search View</a:t>
+            </a:r>
+          </a:p>
+          <a:p>
+            <a:pPr marL="285750" indent="-285750">
+              <a:buFont typeface="Arial" panose="020B0604020202020204" pitchFamily="34" charset="0"/>
+              <a:buChar char="•"/>
+            </a:pPr>
+            <a:r>
+              <a:rPr lang="en-US" dirty="0" smtClean="0"/>
+              <a:t>Properties View</a:t>
+            </a:r>
+          </a:p>
+          <a:p>
+            <a:pPr marL="742950" lvl="1" indent="-285750">
+              <a:buFont typeface="Arial" panose="020B0604020202020204" pitchFamily="34" charset="0"/>
+              <a:buChar char="•"/>
+            </a:pPr>
+            <a:r>
+              <a:rPr lang="en-US" dirty="0" smtClean="0"/>
+              <a:t>Traces</a:t>
+            </a:r>
+          </a:p>
+          <a:p>
+            <a:pPr marL="742950" lvl="1" indent="-285750">
+              <a:buFont typeface="Arial" panose="020B0604020202020204" pitchFamily="34" charset="0"/>
+              <a:buChar char="•"/>
+            </a:pPr>
+            <a:r>
+              <a:rPr lang="en-US" dirty="0" smtClean="0"/>
+              <a:t>Time Axis</a:t>
+            </a:r>
+          </a:p>
+          <a:p>
+            <a:pPr marL="742950" lvl="1" indent="-285750">
+              <a:buFont typeface="Arial" panose="020B0604020202020204" pitchFamily="34" charset="0"/>
+              <a:buChar char="•"/>
+            </a:pPr>
+            <a:r>
+              <a:rPr lang="en-US" dirty="0" smtClean="0"/>
+              <a:t>Value Axis</a:t>
+            </a:r>
+          </a:p>
+          <a:p>
+            <a:pPr marL="742950" lvl="1" indent="-285750">
+              <a:buFont typeface="Arial" panose="020B0604020202020204" pitchFamily="34" charset="0"/>
+              <a:buChar char="•"/>
+            </a:pPr>
+            <a:r>
+              <a:rPr lang="en-US" dirty="0" err="1" smtClean="0"/>
+              <a:t>Misc</a:t>
+            </a:r>
+            <a:endParaRPr lang="en-US" dirty="0" smtClean="0"/>
+          </a:p>
+          <a:p>
+            <a:pPr marL="285750" indent="-285750">
+              <a:buFont typeface="Arial" panose="020B0604020202020204" pitchFamily="34" charset="0"/>
+              <a:buChar char="•"/>
+            </a:pPr>
+            <a:r>
+              <a:rPr lang="en-US" dirty="0" smtClean="0"/>
+              <a:t>Export Samples View</a:t>
+            </a:r>
+            <a:endParaRPr lang="en-US" dirty="0"/>
           </a:p>
         </p:txBody>
       </p:sp>
       <p:pic>
         <p:nvPicPr>
-          <p:cNvPr id="3" name="Content Placeholder 2"/>
+          <p:cNvPr id="6" name="Content Placeholder 5"/>
           <p:cNvPicPr>
             <a:picLocks noGrp="1" noChangeAspect="1"/>
           </p:cNvPicPr>
@@ -5175,15 +5268,45 @@
           </p:nvPr>
         </p:nvPicPr>
         <p:blipFill>
-          <a:blip r:embed="rId3"/>
+          <a:blip r:embed="rId2"/>
           <a:stretch>
             <a:fillRect/>
           </a:stretch>
         </p:blipFill>
         <p:spPr>
           <a:xfrm>
-            <a:off x="4037743" y="882678"/>
-            <a:ext cx="7315201" cy="5182706"/>
+            <a:off x="4772025" y="960792"/>
+            <a:ext cx="7125450" cy="5050626"/>
+          </a:xfrm>
+          <a:prstGeom prst="rect">
+            <a:avLst/>
+          </a:prstGeom>
+        </p:spPr>
+      </p:pic>
+      <p:pic>
+        <p:nvPicPr>
+          <p:cNvPr id="5" name="Picture 4"/>
+          <p:cNvPicPr>
+            <a:picLocks noChangeAspect="1"/>
+          </p:cNvPicPr>
+          <p:nvPr/>
+        </p:nvPicPr>
+        <p:blipFill>
+          <a:blip r:embed="rId3">
+            <a:extLst>
+              <a:ext uri="{28A0092B-C50C-407E-A947-70E740481C1C}">
+                <a14:useLocalDpi xmlns:a14="http://schemas.microsoft.com/office/drawing/2010/main" val="0"/>
+              </a:ext>
+            </a:extLst>
+          </a:blip>
+          <a:stretch>
+            <a:fillRect/>
+          </a:stretch>
+        </p:blipFill>
+        <p:spPr>
+          <a:xfrm>
+            <a:off x="1581539" y="2676331"/>
+            <a:ext cx="194388" cy="194388"/>
           </a:xfrm>
           <a:prstGeom prst="rect">
             <a:avLst/>
@@ -5193,7 +5316,7 @@
     </p:spTree>
     <p:extLst>
       <p:ext uri="{BB962C8B-B14F-4D97-AF65-F5344CB8AC3E}">
-        <p14:creationId xmlns:p14="http://schemas.microsoft.com/office/powerpoint/2010/main" val="3130236956"/>
+        <p14:creationId xmlns:p14="http://schemas.microsoft.com/office/powerpoint/2010/main" val="1769683005"/>
       </p:ext>
     </p:extLst>
   </p:cSld>
@@ -5222,7 +5345,7 @@
       </p:grpSpPr>
       <p:sp>
         <p:nvSpPr>
-          <p:cNvPr id="2" name="Title 1"/>
+          <p:cNvPr id="7" name="Title 6"/>
           <p:cNvSpPr>
             <a:spLocks noGrp="1"/>
           </p:cNvSpPr>
@@ -5237,7 +5360,7 @@
           <a:p>
             <a:r>
               <a:rPr lang="en-US" dirty="0" smtClean="0"/>
-              <a:t>Data Browser Perspective</a:t>
+              <a:t>Adding PV’s</a:t>
             </a:r>
             <a:endParaRPr lang="en-US" dirty="0"/>
           </a:p>
@@ -5245,7 +5368,7 @@
       </p:sp>
       <p:sp>
         <p:nvSpPr>
-          <p:cNvPr id="4" name="Text Placeholder 3"/>
+          <p:cNvPr id="8" name="Text Placeholder 7"/>
           <p:cNvSpPr>
             <a:spLocks noGrp="1"/>
           </p:cNvSpPr>
@@ -5264,86 +5387,80 @@
             </a:pPr>
             <a:r>
               <a:rPr lang="en-US" dirty="0" smtClean="0"/>
-              <a:t>Plot</a:t>
-            </a:r>
+              <a:t>Right click </a:t>
+            </a:r>
+            <a:r>
+              <a:rPr lang="en-US" dirty="0" smtClean="0">
+                <a:sym typeface="Wingdings" panose="05000000000000000000" pitchFamily="2" charset="2"/>
+              </a:rPr>
+              <a:t> Add PV</a:t>
+            </a:r>
+            <a:br>
+              <a:rPr lang="en-US" dirty="0" smtClean="0">
+                <a:sym typeface="Wingdings" panose="05000000000000000000" pitchFamily="2" charset="2"/>
+              </a:rPr>
+            </a:br>
+            <a:r>
+              <a:rPr lang="en-US" dirty="0" smtClean="0">
+                <a:sym typeface="Wingdings" panose="05000000000000000000" pitchFamily="2" charset="2"/>
+              </a:rPr>
+              <a:t>Name</a:t>
+            </a:r>
+            <a:r>
+              <a:rPr lang="en-US" dirty="0">
+                <a:sym typeface="Wingdings" panose="05000000000000000000" pitchFamily="2" charset="2"/>
+              </a:rPr>
+              <a:t>:</a:t>
+            </a:r>
+            <a:br>
+              <a:rPr lang="en-US" dirty="0">
+                <a:sym typeface="Wingdings" panose="05000000000000000000" pitchFamily="2" charset="2"/>
+              </a:rPr>
+            </a:br>
+            <a:r>
+              <a:rPr lang="en-US" i="1" dirty="0" smtClean="0">
+                <a:sym typeface="Wingdings" panose="05000000000000000000" pitchFamily="2" charset="2"/>
+              </a:rPr>
+              <a:t>XF:31IDA-OP{Tbl-Ax:X2}</a:t>
+            </a:r>
+            <a:r>
+              <a:rPr lang="en-US" i="1" dirty="0" err="1" smtClean="0">
+                <a:sym typeface="Wingdings" panose="05000000000000000000" pitchFamily="2" charset="2"/>
+              </a:rPr>
+              <a:t>Mtr</a:t>
+            </a:r>
+            <a:endParaRPr lang="en-US" i="1" dirty="0" smtClean="0">
+              <a:sym typeface="Wingdings" panose="05000000000000000000" pitchFamily="2" charset="2"/>
+            </a:endParaRPr>
+          </a:p>
+          <a:p>
+            <a:r>
+              <a:rPr lang="en-US" i="1" dirty="0">
+                <a:sym typeface="Wingdings" panose="05000000000000000000" pitchFamily="2" charset="2"/>
+              </a:rPr>
+              <a:t/>
+            </a:r>
+            <a:br>
+              <a:rPr lang="en-US" i="1" dirty="0">
+                <a:sym typeface="Wingdings" panose="05000000000000000000" pitchFamily="2" charset="2"/>
+              </a:rPr>
+            </a:br>
+            <a:endParaRPr lang="en-US" i="1" dirty="0" smtClean="0">
+              <a:sym typeface="Wingdings" panose="05000000000000000000" pitchFamily="2" charset="2"/>
+            </a:endParaRPr>
           </a:p>
           <a:p>
             <a:pPr marL="285750" indent="-285750">
               <a:buFont typeface="Arial" panose="020B0604020202020204" pitchFamily="34" charset="0"/>
               <a:buChar char="•"/>
             </a:pPr>
-            <a:r>
-              <a:rPr lang="en-US" dirty="0" smtClean="0"/>
-              <a:t>Archive Search View</a:t>
-            </a:r>
-          </a:p>
-          <a:p>
-            <a:pPr marL="285750" indent="-285750">
-              <a:buFont typeface="Arial" panose="020B0604020202020204" pitchFamily="34" charset="0"/>
-              <a:buChar char="•"/>
-            </a:pPr>
-            <a:r>
-              <a:rPr lang="en-US" dirty="0" smtClean="0"/>
-              <a:t>Properties View</a:t>
-            </a:r>
-          </a:p>
-          <a:p>
-            <a:pPr marL="742950" lvl="1" indent="-285750">
-              <a:buFont typeface="Arial" panose="020B0604020202020204" pitchFamily="34" charset="0"/>
-              <a:buChar char="•"/>
-            </a:pPr>
-            <a:r>
-              <a:rPr lang="en-US" dirty="0" smtClean="0"/>
-              <a:t>Traces</a:t>
-            </a:r>
-          </a:p>
-          <a:p>
-            <a:pPr marL="742950" lvl="1" indent="-285750">
-              <a:buFont typeface="Arial" panose="020B0604020202020204" pitchFamily="34" charset="0"/>
-              <a:buChar char="•"/>
-            </a:pPr>
-            <a:r>
-              <a:rPr lang="en-US" dirty="0" smtClean="0"/>
-              <a:t>Time Axis</a:t>
-            </a:r>
-          </a:p>
-          <a:p>
-            <a:pPr marL="742950" lvl="1" indent="-285750">
-              <a:buFont typeface="Arial" panose="020B0604020202020204" pitchFamily="34" charset="0"/>
-              <a:buChar char="•"/>
-            </a:pPr>
-            <a:r>
-              <a:rPr lang="en-US" dirty="0" smtClean="0"/>
-              <a:t>Value Axis</a:t>
-            </a:r>
-          </a:p>
-          <a:p>
-            <a:pPr marL="742950" lvl="1" indent="-285750">
-              <a:buFont typeface="Arial" panose="020B0604020202020204" pitchFamily="34" charset="0"/>
-              <a:buChar char="•"/>
-            </a:pPr>
-            <a:r>
-              <a:rPr lang="en-US" dirty="0" err="1" smtClean="0"/>
-              <a:t>Misc</a:t>
-            </a:r>
-            <a:endParaRPr lang="en-US" dirty="0" smtClean="0"/>
-          </a:p>
-          <a:p>
-            <a:pPr marL="285750" indent="-285750">
-              <a:buFont typeface="Arial" panose="020B0604020202020204" pitchFamily="34" charset="0"/>
-              <a:buChar char="•"/>
-            </a:pPr>
-            <a:r>
-              <a:rPr lang="en-US" dirty="0" smtClean="0"/>
-              <a:t>Export Samples View</a:t>
-            </a:r>
-            <a:endParaRPr lang="en-US" dirty="0"/>
+            <a:endParaRPr lang="en-US" i="1" dirty="0"/>
           </a:p>
         </p:txBody>
       </p:sp>
       <p:pic>
         <p:nvPicPr>
-          <p:cNvPr id="6" name="Content Placeholder 5"/>
+          <p:cNvPr id="3" name="Content Placeholder 2"/>
           <p:cNvPicPr>
             <a:picLocks noGrp="1" noChangeAspect="1"/>
           </p:cNvPicPr>
@@ -5352,15 +5469,15 @@
           </p:nvPr>
         </p:nvPicPr>
         <p:blipFill>
-          <a:blip r:embed="rId2"/>
+          <a:blip r:embed="rId3"/>
           <a:stretch>
             <a:fillRect/>
           </a:stretch>
         </p:blipFill>
         <p:spPr>
           <a:xfrm>
-            <a:off x="4104204" y="939021"/>
-            <a:ext cx="7125450" cy="5050626"/>
+            <a:off x="4037743" y="882678"/>
+            <a:ext cx="7315201" cy="5182706"/>
           </a:xfrm>
           <a:prstGeom prst="rect">
             <a:avLst/>
@@ -5370,7 +5487,7 @@
     </p:spTree>
     <p:extLst>
       <p:ext uri="{BB962C8B-B14F-4D97-AF65-F5344CB8AC3E}">
-        <p14:creationId xmlns:p14="http://schemas.microsoft.com/office/powerpoint/2010/main" val="1769683005"/>
+        <p14:creationId xmlns:p14="http://schemas.microsoft.com/office/powerpoint/2010/main" val="3130236956"/>
       </p:ext>
     </p:extLst>
   </p:cSld>

</xml_diff>